<commit_message>
Modif de la ft_strnew pour RAZ, derniere version du ppt algo (passage a google drive depuis)
</commit_message>
<xml_diff>
--- a/Diagramme_gnl.pptx
+++ b/Diagramme_gnl.pptx
@@ -290,7 +290,7 @@
           <a:p>
             <a:fld id="{BE944CB8-E67E-EC44-A516-3AB574453401}" type="datetimeFigureOut">
               <a:rPr lang="fr-FR" smtClean="0"/>
-              <a:t>23/01/15</a:t>
+              <a:t>27/01/15</a:t>
             </a:fld>
             <a:endParaRPr lang="fr-FR" dirty="0"/>
           </a:p>
@@ -460,7 +460,7 @@
           <a:p>
             <a:fld id="{BE944CB8-E67E-EC44-A516-3AB574453401}" type="datetimeFigureOut">
               <a:rPr lang="fr-FR" smtClean="0"/>
-              <a:t>23/01/15</a:t>
+              <a:t>27/01/15</a:t>
             </a:fld>
             <a:endParaRPr lang="fr-FR" dirty="0"/>
           </a:p>
@@ -640,7 +640,7 @@
           <a:p>
             <a:fld id="{BE944CB8-E67E-EC44-A516-3AB574453401}" type="datetimeFigureOut">
               <a:rPr lang="fr-FR" smtClean="0"/>
-              <a:t>23/01/15</a:t>
+              <a:t>27/01/15</a:t>
             </a:fld>
             <a:endParaRPr lang="fr-FR" dirty="0"/>
           </a:p>
@@ -810,7 +810,7 @@
           <a:p>
             <a:fld id="{BE944CB8-E67E-EC44-A516-3AB574453401}" type="datetimeFigureOut">
               <a:rPr lang="fr-FR" smtClean="0"/>
-              <a:t>23/01/15</a:t>
+              <a:t>27/01/15</a:t>
             </a:fld>
             <a:endParaRPr lang="fr-FR" dirty="0"/>
           </a:p>
@@ -1056,7 +1056,7 @@
           <a:p>
             <a:fld id="{BE944CB8-E67E-EC44-A516-3AB574453401}" type="datetimeFigureOut">
               <a:rPr lang="fr-FR" smtClean="0"/>
-              <a:t>23/01/15</a:t>
+              <a:t>27/01/15</a:t>
             </a:fld>
             <a:endParaRPr lang="fr-FR" dirty="0"/>
           </a:p>
@@ -1344,7 +1344,7 @@
           <a:p>
             <a:fld id="{BE944CB8-E67E-EC44-A516-3AB574453401}" type="datetimeFigureOut">
               <a:rPr lang="fr-FR" smtClean="0"/>
-              <a:t>23/01/15</a:t>
+              <a:t>27/01/15</a:t>
             </a:fld>
             <a:endParaRPr lang="fr-FR" dirty="0"/>
           </a:p>
@@ -1766,7 +1766,7 @@
           <a:p>
             <a:fld id="{BE944CB8-E67E-EC44-A516-3AB574453401}" type="datetimeFigureOut">
               <a:rPr lang="fr-FR" smtClean="0"/>
-              <a:t>23/01/15</a:t>
+              <a:t>27/01/15</a:t>
             </a:fld>
             <a:endParaRPr lang="fr-FR" dirty="0"/>
           </a:p>
@@ -1884,7 +1884,7 @@
           <a:p>
             <a:fld id="{BE944CB8-E67E-EC44-A516-3AB574453401}" type="datetimeFigureOut">
               <a:rPr lang="fr-FR" smtClean="0"/>
-              <a:t>23/01/15</a:t>
+              <a:t>27/01/15</a:t>
             </a:fld>
             <a:endParaRPr lang="fr-FR" dirty="0"/>
           </a:p>
@@ -1979,7 +1979,7 @@
           <a:p>
             <a:fld id="{BE944CB8-E67E-EC44-A516-3AB574453401}" type="datetimeFigureOut">
               <a:rPr lang="fr-FR" smtClean="0"/>
-              <a:t>23/01/15</a:t>
+              <a:t>27/01/15</a:t>
             </a:fld>
             <a:endParaRPr lang="fr-FR" dirty="0"/>
           </a:p>
@@ -2256,7 +2256,7 @@
           <a:p>
             <a:fld id="{BE944CB8-E67E-EC44-A516-3AB574453401}" type="datetimeFigureOut">
               <a:rPr lang="fr-FR" smtClean="0"/>
-              <a:t>23/01/15</a:t>
+              <a:t>27/01/15</a:t>
             </a:fld>
             <a:endParaRPr lang="fr-FR" dirty="0"/>
           </a:p>
@@ -2509,7 +2509,7 @@
           <a:p>
             <a:fld id="{BE944CB8-E67E-EC44-A516-3AB574453401}" type="datetimeFigureOut">
               <a:rPr lang="fr-FR" smtClean="0"/>
-              <a:t>23/01/15</a:t>
+              <a:t>27/01/15</a:t>
             </a:fld>
             <a:endParaRPr lang="fr-FR" dirty="0"/>
           </a:p>
@@ -2722,7 +2722,7 @@
           <a:p>
             <a:fld id="{BE944CB8-E67E-EC44-A516-3AB574453401}" type="datetimeFigureOut">
               <a:rPr lang="fr-FR" smtClean="0"/>
-              <a:t>23/01/15</a:t>
+              <a:t>27/01/15</a:t>
             </a:fld>
             <a:endParaRPr lang="fr-FR" dirty="0"/>
           </a:p>
@@ -17609,13 +17609,6 @@
               </a:rPr>
               <a:t>&amp;&amp; </a:t>
             </a:r>
-            <a:endParaRPr lang="fr-FR" sz="600" dirty="0" smtClean="0">
-              <a:solidFill>
-                <a:schemeClr val="bg1"/>
-              </a:solidFill>
-              <a:latin typeface="Arial"/>
-              <a:cs typeface="Arial"/>
-            </a:endParaRPr>
           </a:p>
           <a:p>
             <a:pPr algn="ctr"/>
@@ -17637,27 +17630,7 @@
                 <a:latin typeface="Arial"/>
                 <a:cs typeface="Arial"/>
               </a:rPr>
-              <a:t>[</a:t>
-            </a:r>
-            <a:r>
-              <a:rPr lang="fr-FR" sz="600" dirty="0" smtClean="0">
-                <a:solidFill>
-                  <a:schemeClr val="bg1"/>
-                </a:solidFill>
-                <a:latin typeface="Arial"/>
-                <a:cs typeface="Arial"/>
-              </a:rPr>
-              <a:t>n] </a:t>
-            </a:r>
-            <a:r>
-              <a:rPr lang="fr-FR" sz="600" dirty="0" smtClean="0">
-                <a:solidFill>
-                  <a:schemeClr val="bg1"/>
-                </a:solidFill>
-                <a:latin typeface="Arial"/>
-                <a:cs typeface="Arial"/>
-              </a:rPr>
-              <a:t>=! NULL</a:t>
+              <a:t>[n] =! NULL</a:t>
             </a:r>
             <a:endParaRPr lang="fr-FR" sz="600" dirty="0">
               <a:solidFill>
@@ -18577,17 +18550,7 @@
                 <a:latin typeface="Arial"/>
                 <a:cs typeface="Arial"/>
               </a:rPr>
-              <a:t>[n</a:t>
-            </a:r>
-            <a:r>
-              <a:rPr lang="fr-FR" sz="600" dirty="0" smtClean="0">
-                <a:solidFill>
-                  <a:schemeClr val="bg1"/>
-                </a:solidFill>
-                <a:latin typeface="Arial"/>
-                <a:cs typeface="Arial"/>
-              </a:rPr>
-              <a:t>] </a:t>
+              <a:t>[n] </a:t>
             </a:r>
             <a:r>
               <a:rPr lang="fr-FR" sz="600" dirty="0" err="1" smtClean="0">
@@ -18712,13 +18675,6 @@
               </a:rPr>
               <a:t>Free &amp; NULL</a:t>
             </a:r>
-            <a:endParaRPr lang="fr-FR" sz="600" dirty="0" smtClean="0">
-              <a:solidFill>
-                <a:schemeClr val="bg1"/>
-              </a:solidFill>
-              <a:latin typeface="Arial"/>
-              <a:cs typeface="Arial"/>
-            </a:endParaRPr>
           </a:p>
           <a:p>
             <a:pPr algn="ctr"/>
@@ -19449,13 +19405,6 @@
               </a:rPr>
               <a:t>Free &amp; NULL</a:t>
             </a:r>
-            <a:endParaRPr lang="fr-FR" sz="600" dirty="0" smtClean="0">
-              <a:solidFill>
-                <a:schemeClr val="bg1"/>
-              </a:solidFill>
-              <a:latin typeface="Arial"/>
-              <a:cs typeface="Arial"/>
-            </a:endParaRPr>
           </a:p>
           <a:p>
             <a:pPr algn="ctr"/>
@@ -21700,7 +21649,7 @@
         </p:nvSpPr>
         <p:spPr>
           <a:xfrm>
-            <a:off x="12337765" y="6886640"/>
+            <a:off x="12354642" y="7678460"/>
             <a:ext cx="1036668" cy="541278"/>
           </a:xfrm>
           <a:prstGeom prst="flowChartDecision">
@@ -21888,7 +21837,7 @@
         </p:nvSpPr>
         <p:spPr>
           <a:xfrm>
-            <a:off x="12549710" y="6381155"/>
+            <a:off x="12566587" y="7172975"/>
             <a:ext cx="605518" cy="287559"/>
           </a:xfrm>
           <a:prstGeom prst="rect">
@@ -21981,7 +21930,7 @@
         </p:nvSpPr>
         <p:spPr>
           <a:xfrm>
-            <a:off x="13645004" y="7032709"/>
+            <a:off x="13661881" y="7824529"/>
             <a:ext cx="444069" cy="244929"/>
           </a:xfrm>
           <a:prstGeom prst="flowChartTerminator">
@@ -22049,7 +21998,7 @@
         </p:nvSpPr>
         <p:spPr>
           <a:xfrm>
-            <a:off x="12636999" y="7686498"/>
+            <a:off x="12653876" y="8478318"/>
             <a:ext cx="444069" cy="244929"/>
           </a:xfrm>
           <a:prstGeom prst="flowChartTerminator">
@@ -22178,7 +22127,7 @@
         </p:nvCxnSpPr>
         <p:spPr>
           <a:xfrm>
-            <a:off x="13369309" y="7156927"/>
+            <a:off x="13386186" y="7948747"/>
             <a:ext cx="275695" cy="0"/>
           </a:xfrm>
           <a:prstGeom prst="straightConnector1">
@@ -22218,7 +22167,7 @@
         </p:nvSpPr>
         <p:spPr>
           <a:xfrm>
-            <a:off x="13368848" y="7156955"/>
+            <a:off x="13385725" y="7948775"/>
             <a:ext cx="229053" cy="213178"/>
           </a:xfrm>
           <a:prstGeom prst="rect">
@@ -22277,7 +22226,7 @@
         </p:nvCxnSpPr>
         <p:spPr>
           <a:xfrm flipV="1">
-            <a:off x="13476779" y="7102469"/>
+            <a:off x="13493656" y="7894289"/>
             <a:ext cx="0" cy="108916"/>
           </a:xfrm>
           <a:prstGeom prst="line">
@@ -22318,7 +22267,7 @@
         </p:nvCxnSpPr>
         <p:spPr>
           <a:xfrm>
-            <a:off x="12859034" y="7431187"/>
+            <a:off x="12875911" y="8223007"/>
             <a:ext cx="0" cy="272658"/>
           </a:xfrm>
           <a:prstGeom prst="straightConnector1">
@@ -22358,7 +22307,7 @@
         </p:nvCxnSpPr>
         <p:spPr>
           <a:xfrm>
-            <a:off x="12803469" y="7528763"/>
+            <a:off x="12820346" y="8320583"/>
             <a:ext cx="127000" cy="1"/>
           </a:xfrm>
           <a:prstGeom prst="line">
@@ -22399,7 +22348,7 @@
         </p:nvSpPr>
         <p:spPr>
           <a:xfrm>
-            <a:off x="12599075" y="7420822"/>
+            <a:off x="12615952" y="8212642"/>
             <a:ext cx="229053" cy="213178"/>
           </a:xfrm>
           <a:prstGeom prst="rect">
@@ -23655,7 +23604,7 @@
         </p:nvCxnSpPr>
         <p:spPr>
           <a:xfrm>
-            <a:off x="12852469" y="6669106"/>
+            <a:off x="12869346" y="7460926"/>
             <a:ext cx="6237" cy="223223"/>
           </a:xfrm>
           <a:prstGeom prst="straightConnector1">
@@ -24799,11 +24748,6 @@
                 </a:rPr>
                 <a:t>1</a:t>
               </a:r>
-              <a:endParaRPr lang="fr-FR" sz="800" dirty="0">
-                <a:solidFill>
-                  <a:schemeClr val="tx1"/>
-                </a:solidFill>
-              </a:endParaRPr>
             </a:p>
           </p:txBody>
         </p:sp>
@@ -25151,11 +25095,6 @@
                 </a:rPr>
                 <a:t>4</a:t>
               </a:r>
-              <a:endParaRPr lang="fr-FR" sz="800" dirty="0">
-                <a:solidFill>
-                  <a:schemeClr val="tx1"/>
-                </a:solidFill>
-              </a:endParaRPr>
             </a:p>
           </p:txBody>
         </p:sp>
@@ -25328,11 +25267,6 @@
                 </a:rPr>
                 <a:t>6</a:t>
               </a:r>
-              <a:endParaRPr lang="fr-FR" sz="800" dirty="0">
-                <a:solidFill>
-                  <a:schemeClr val="tx1"/>
-                </a:solidFill>
-              </a:endParaRPr>
             </a:p>
           </p:txBody>
         </p:sp>
@@ -25387,11 +25321,6 @@
                 </a:rPr>
                 <a:t>2</a:t>
               </a:r>
-              <a:endParaRPr lang="fr-FR" sz="800" dirty="0">
-                <a:solidFill>
-                  <a:schemeClr val="tx1"/>
-                </a:solidFill>
-              </a:endParaRPr>
             </a:p>
           </p:txBody>
         </p:sp>
@@ -25705,11 +25634,6 @@
                 </a:rPr>
                 <a:t>&amp;</a:t>
               </a:r>
-              <a:endParaRPr lang="fr-FR" sz="800" dirty="0">
-                <a:solidFill>
-                  <a:schemeClr val="tx1"/>
-                </a:solidFill>
-              </a:endParaRPr>
             </a:p>
           </p:txBody>
         </p:sp>
@@ -25876,11 +25800,6 @@
                 </a:rPr>
                 <a:t>N</a:t>
               </a:r>
-              <a:endParaRPr lang="fr-FR" sz="800" dirty="0">
-                <a:solidFill>
-                  <a:schemeClr val="tx1"/>
-                </a:solidFill>
-              </a:endParaRPr>
             </a:p>
           </p:txBody>
         </p:sp>
@@ -25933,11 +25852,6 @@
                 </a:rPr>
                 <a:t>N</a:t>
               </a:r>
-              <a:endParaRPr lang="fr-FR" sz="800" dirty="0">
-                <a:solidFill>
-                  <a:schemeClr val="tx1"/>
-                </a:solidFill>
-              </a:endParaRPr>
             </a:p>
           </p:txBody>
         </p:sp>
@@ -26184,7 +26098,7 @@
         </p:nvSpPr>
         <p:spPr>
           <a:xfrm>
-            <a:off x="12498074" y="5870250"/>
+            <a:off x="12514951" y="6662070"/>
             <a:ext cx="694910" cy="291014"/>
           </a:xfrm>
           <a:prstGeom prst="rect">
@@ -26357,7 +26271,7 @@
         </p:nvSpPr>
         <p:spPr>
           <a:xfrm>
-            <a:off x="12518484" y="4692320"/>
+            <a:off x="12535361" y="5484140"/>
             <a:ext cx="605518" cy="287559"/>
           </a:xfrm>
           <a:prstGeom prst="rect">
@@ -26442,13 +26356,6 @@
               </a:rPr>
               <a:t>[n]</a:t>
             </a:r>
-            <a:endParaRPr lang="fr-FR" sz="600" dirty="0" smtClean="0">
-              <a:solidFill>
-                <a:schemeClr val="bg1"/>
-              </a:solidFill>
-              <a:latin typeface="Arial"/>
-              <a:cs typeface="Arial"/>
-            </a:endParaRPr>
           </a:p>
         </p:txBody>
       </p:sp>
@@ -26460,7 +26367,7 @@
         </p:nvSpPr>
         <p:spPr>
           <a:xfrm>
-            <a:off x="12506010" y="4188818"/>
+            <a:off x="12522887" y="4980638"/>
             <a:ext cx="605518" cy="287559"/>
           </a:xfrm>
           <a:prstGeom prst="rect">
@@ -26505,13 +26412,6 @@
               </a:rPr>
               <a:t>Free &amp; NULL</a:t>
             </a:r>
-            <a:endParaRPr lang="fr-FR" sz="600" dirty="0" smtClean="0">
-              <a:solidFill>
-                <a:schemeClr val="bg1"/>
-              </a:solidFill>
-              <a:latin typeface="Arial"/>
-              <a:cs typeface="Arial"/>
-            </a:endParaRPr>
           </a:p>
           <a:p>
             <a:pPr algn="ctr"/>
@@ -26546,7 +26446,7 @@
         </p:nvCxnSpPr>
         <p:spPr>
           <a:xfrm>
-            <a:off x="12815006" y="4478941"/>
+            <a:off x="12831883" y="5270761"/>
             <a:ext cx="6237" cy="223223"/>
           </a:xfrm>
           <a:prstGeom prst="straightConnector1">
@@ -26586,7 +26486,7 @@
         </p:nvSpPr>
         <p:spPr>
           <a:xfrm>
-            <a:off x="12442919" y="5188681"/>
+            <a:off x="12459796" y="5980501"/>
             <a:ext cx="771934" cy="458346"/>
           </a:xfrm>
           <a:prstGeom prst="flowChartDecision">
@@ -26657,7 +26557,7 @@
         </p:nvCxnSpPr>
         <p:spPr>
           <a:xfrm>
-            <a:off x="12831152" y="5647027"/>
+            <a:off x="12848029" y="6438847"/>
             <a:ext cx="6237" cy="223223"/>
           </a:xfrm>
           <a:prstGeom prst="straightConnector1">
@@ -26697,7 +26597,7 @@
         </p:nvCxnSpPr>
         <p:spPr>
           <a:xfrm>
-            <a:off x="12769917" y="5724190"/>
+            <a:off x="12786794" y="6516010"/>
             <a:ext cx="127000" cy="1"/>
           </a:xfrm>
           <a:prstGeom prst="line">
@@ -26738,7 +26638,7 @@
         </p:nvSpPr>
         <p:spPr>
           <a:xfrm>
-            <a:off x="12874237" y="5602640"/>
+            <a:off x="12891114" y="6394460"/>
             <a:ext cx="229053" cy="213178"/>
           </a:xfrm>
           <a:prstGeom prst="rect">
@@ -26797,7 +26697,7 @@
         </p:nvCxnSpPr>
         <p:spPr>
           <a:xfrm flipH="1">
-            <a:off x="12171773" y="5420361"/>
+            <a:off x="12188650" y="6212181"/>
             <a:ext cx="279788" cy="0"/>
           </a:xfrm>
           <a:prstGeom prst="straightConnector1">
@@ -26837,7 +26737,7 @@
         </p:nvCxnSpPr>
         <p:spPr>
           <a:xfrm flipV="1">
-            <a:off x="12379986" y="5356857"/>
+            <a:off x="12396863" y="6148677"/>
             <a:ext cx="0" cy="108916"/>
           </a:xfrm>
           <a:prstGeom prst="line">
@@ -26878,7 +26778,7 @@
         </p:nvSpPr>
         <p:spPr>
           <a:xfrm>
-            <a:off x="12265459" y="5420241"/>
+            <a:off x="12282336" y="6212061"/>
             <a:ext cx="229053" cy="213178"/>
           </a:xfrm>
           <a:prstGeom prst="rect">
@@ -26937,7 +26837,7 @@
         </p:nvSpPr>
         <p:spPr>
           <a:xfrm>
-            <a:off x="11727704" y="5299478"/>
+            <a:off x="11744581" y="6091298"/>
             <a:ext cx="444069" cy="244929"/>
           </a:xfrm>
           <a:prstGeom prst="flowChartTerminator">
@@ -27005,7 +26905,7 @@
         </p:nvCxnSpPr>
         <p:spPr>
           <a:xfrm>
-            <a:off x="12824505" y="4979879"/>
+            <a:off x="12841382" y="5771699"/>
             <a:ext cx="6237" cy="223223"/>
           </a:xfrm>
           <a:prstGeom prst="straightConnector1">
@@ -27045,7 +26945,7 @@
         </p:nvCxnSpPr>
         <p:spPr>
           <a:xfrm>
-            <a:off x="12844826" y="6161264"/>
+            <a:off x="12861703" y="6953084"/>
             <a:ext cx="6237" cy="223223"/>
           </a:xfrm>
           <a:prstGeom prst="straightConnector1">
@@ -27085,7 +26985,7 @@
         </p:nvSpPr>
         <p:spPr>
           <a:xfrm>
-            <a:off x="12845942" y="4936094"/>
+            <a:off x="12862819" y="5727914"/>
             <a:ext cx="570197" cy="125634"/>
           </a:xfrm>
           <a:prstGeom prst="flowChartOnlineStorage">
@@ -28038,8 +27938,8 @@
         </p:nvSpPr>
         <p:spPr>
           <a:xfrm>
-            <a:off x="2825569" y="3052693"/>
-            <a:ext cx="1018708" cy="2228272"/>
+            <a:off x="2262361" y="3052693"/>
+            <a:ext cx="1581916" cy="2228272"/>
           </a:xfrm>
           <a:prstGeom prst="rect">
             <a:avLst/>
@@ -28233,6 +28133,96 @@
               <a:t>fdmax</a:t>
             </a:r>
             <a:endParaRPr lang="fr-FR" sz="800" dirty="0">
+              <a:solidFill>
+                <a:schemeClr val="tx1"/>
+              </a:solidFill>
+            </a:endParaRPr>
+          </a:p>
+          <a:p>
+            <a:endParaRPr lang="fr-FR" sz="800" dirty="0" smtClean="0">
+              <a:solidFill>
+                <a:schemeClr val="tx1"/>
+              </a:solidFill>
+            </a:endParaRPr>
+          </a:p>
+          <a:p>
+            <a:r>
+              <a:rPr lang="fr-FR" sz="800" dirty="0" smtClean="0">
+                <a:solidFill>
+                  <a:schemeClr val="tx1"/>
+                </a:solidFill>
+              </a:rPr>
+              <a:t>NOTES</a:t>
+            </a:r>
+          </a:p>
+          <a:p>
+            <a:r>
+              <a:rPr lang="fr-FR" sz="800" dirty="0" smtClean="0">
+                <a:solidFill>
+                  <a:schemeClr val="tx1"/>
+                </a:solidFill>
+              </a:rPr>
+              <a:t>Use </a:t>
+            </a:r>
+            <a:r>
+              <a:rPr lang="fr-FR" sz="800" dirty="0" err="1" smtClean="0">
+                <a:solidFill>
+                  <a:schemeClr val="tx1"/>
+                </a:solidFill>
+              </a:rPr>
+              <a:t>ft_strdel</a:t>
+            </a:r>
+            <a:r>
+              <a:rPr lang="fr-FR" sz="800" dirty="0" smtClean="0">
+                <a:solidFill>
+                  <a:schemeClr val="tx1"/>
+                </a:solidFill>
+              </a:rPr>
+              <a:t> to f</a:t>
+            </a:r>
+            <a:r>
+              <a:rPr lang="fr-FR" sz="800" dirty="0" smtClean="0">
+                <a:solidFill>
+                  <a:schemeClr val="tx1"/>
+                </a:solidFill>
+              </a:rPr>
+              <a:t>ree &amp; NULL </a:t>
+            </a:r>
+          </a:p>
+          <a:p>
+            <a:r>
+              <a:rPr lang="fr-FR" sz="800" dirty="0" smtClean="0">
+                <a:solidFill>
+                  <a:schemeClr val="tx1"/>
+                </a:solidFill>
+              </a:rPr>
+              <a:t>Use </a:t>
+            </a:r>
+            <a:r>
+              <a:rPr lang="fr-FR" sz="800" dirty="0" err="1" smtClean="0">
+                <a:solidFill>
+                  <a:schemeClr val="tx1"/>
+                </a:solidFill>
+              </a:rPr>
+              <a:t>ft_strnew</a:t>
+            </a:r>
+            <a:r>
+              <a:rPr lang="fr-FR" sz="800" dirty="0" smtClean="0">
+                <a:solidFill>
+                  <a:schemeClr val="tx1"/>
+                </a:solidFill>
+              </a:rPr>
+              <a:t> to </a:t>
+            </a:r>
+            <a:r>
+              <a:rPr lang="fr-FR" sz="800" dirty="0" err="1" smtClean="0">
+                <a:solidFill>
+                  <a:schemeClr val="tx1"/>
+                </a:solidFill>
+              </a:rPr>
+              <a:t>malloc</a:t>
+            </a:r>
+            <a:endParaRPr lang="fr-FR" sz="800" dirty="0" smtClean="0">
               <a:solidFill>
                 <a:schemeClr val="tx1"/>
               </a:solidFill>
@@ -28584,8 +28574,8 @@
         </p:nvSpPr>
         <p:spPr>
           <a:xfrm>
-            <a:off x="7442660" y="5115146"/>
-            <a:ext cx="2109771" cy="1895345"/>
+            <a:off x="7442660" y="5115147"/>
+            <a:ext cx="2109771" cy="1492492"/>
           </a:xfrm>
           <a:prstGeom prst="roundRect">
             <a:avLst>
@@ -28647,8 +28637,8 @@
         </p:nvSpPr>
         <p:spPr>
           <a:xfrm>
-            <a:off x="11599364" y="4157848"/>
-            <a:ext cx="2200672" cy="2078712"/>
+            <a:off x="11616241" y="4949668"/>
+            <a:ext cx="2200672" cy="1626699"/>
           </a:xfrm>
           <a:prstGeom prst="roundRect">
             <a:avLst>
@@ -28805,6 +28795,558 @@
           </a:p>
         </p:txBody>
       </p:sp>
+      <p:sp>
+        <p:nvSpPr>
+          <p:cNvPr id="207" name="Décision 206"/>
+          <p:cNvSpPr/>
+          <p:nvPr/>
+        </p:nvSpPr>
+        <p:spPr>
+          <a:xfrm>
+            <a:off x="12124466" y="4184252"/>
+            <a:ext cx="1369190" cy="592801"/>
+          </a:xfrm>
+          <a:prstGeom prst="flowChartDecision">
+            <a:avLst/>
+          </a:prstGeom>
+          <a:solidFill>
+            <a:schemeClr val="tx2"/>
+          </a:solidFill>
+          <a:ln>
+            <a:noFill/>
+          </a:ln>
+          <a:effectLst/>
+        </p:spPr>
+        <p:style>
+          <a:lnRef idx="1">
+            <a:schemeClr val="accent1"/>
+          </a:lnRef>
+          <a:fillRef idx="3">
+            <a:schemeClr val="accent1"/>
+          </a:fillRef>
+          <a:effectRef idx="2">
+            <a:schemeClr val="accent1"/>
+          </a:effectRef>
+          <a:fontRef idx="minor">
+            <a:schemeClr val="lt1"/>
+          </a:fontRef>
+        </p:style>
+        <p:txBody>
+          <a:bodyPr lIns="36000" tIns="0" rIns="36000" bIns="0" rtlCol="0" anchor="ctr"/>
+          <a:lstStyle/>
+          <a:p>
+            <a:pPr algn="ctr"/>
+            <a:r>
+              <a:rPr lang="fr-FR" sz="600" dirty="0" smtClean="0">
+                <a:solidFill>
+                  <a:schemeClr val="bg1"/>
+                </a:solidFill>
+                <a:latin typeface="Arial"/>
+                <a:cs typeface="Arial"/>
+              </a:rPr>
+              <a:t>Len </a:t>
+            </a:r>
+            <a:r>
+              <a:rPr lang="fr-FR" sz="600" dirty="0" err="1" smtClean="0">
+                <a:solidFill>
+                  <a:schemeClr val="bg1"/>
+                </a:solidFill>
+                <a:latin typeface="Arial"/>
+                <a:cs typeface="Arial"/>
+              </a:rPr>
+              <a:t>tmp</a:t>
+            </a:r>
+            <a:r>
+              <a:rPr lang="fr-FR" sz="600" dirty="0" smtClean="0">
+                <a:solidFill>
+                  <a:schemeClr val="bg1"/>
+                </a:solidFill>
+                <a:latin typeface="Arial"/>
+                <a:cs typeface="Arial"/>
+              </a:rPr>
+              <a:t> /n to /0 </a:t>
+            </a:r>
+          </a:p>
+          <a:p>
+            <a:pPr algn="ctr"/>
+            <a:r>
+              <a:rPr lang="fr-FR" sz="600" dirty="0" smtClean="0">
+                <a:solidFill>
+                  <a:schemeClr val="bg1"/>
+                </a:solidFill>
+                <a:latin typeface="Arial"/>
+                <a:cs typeface="Arial"/>
+              </a:rPr>
+              <a:t>&lt;= </a:t>
+            </a:r>
+            <a:r>
+              <a:rPr lang="fr-FR" sz="600" dirty="0" err="1" smtClean="0">
+                <a:solidFill>
+                  <a:schemeClr val="bg1"/>
+                </a:solidFill>
+                <a:latin typeface="Arial"/>
+                <a:cs typeface="Arial"/>
+              </a:rPr>
+              <a:t>strlen</a:t>
+            </a:r>
+            <a:r>
+              <a:rPr lang="fr-FR" sz="600" dirty="0" smtClean="0">
+                <a:solidFill>
+                  <a:schemeClr val="bg1"/>
+                </a:solidFill>
+                <a:latin typeface="Arial"/>
+                <a:cs typeface="Arial"/>
+              </a:rPr>
+              <a:t>(</a:t>
+            </a:r>
+            <a:r>
+              <a:rPr lang="fr-FR" sz="600" dirty="0" err="1" smtClean="0">
+                <a:solidFill>
+                  <a:schemeClr val="bg1"/>
+                </a:solidFill>
+                <a:latin typeface="Arial"/>
+                <a:cs typeface="Arial"/>
+              </a:rPr>
+              <a:t>keep.str</a:t>
+            </a:r>
+            <a:r>
+              <a:rPr lang="fr-FR" sz="600" dirty="0" smtClean="0">
+                <a:solidFill>
+                  <a:schemeClr val="bg1"/>
+                </a:solidFill>
+                <a:latin typeface="Arial"/>
+                <a:cs typeface="Arial"/>
+              </a:rPr>
+              <a:t>[n]) ?</a:t>
+            </a:r>
+            <a:endParaRPr lang="fr-FR" sz="600" dirty="0">
+              <a:solidFill>
+                <a:schemeClr val="bg1"/>
+              </a:solidFill>
+              <a:latin typeface="Arial"/>
+              <a:cs typeface="Arial"/>
+            </a:endParaRPr>
+          </a:p>
+        </p:txBody>
+      </p:sp>
+      <p:cxnSp>
+        <p:nvCxnSpPr>
+          <p:cNvPr id="210" name="Connecteur droit avec flèche 209"/>
+          <p:cNvCxnSpPr/>
+          <p:nvPr/>
+        </p:nvCxnSpPr>
+        <p:spPr>
+          <a:xfrm>
+            <a:off x="12811327" y="4767519"/>
+            <a:ext cx="6237" cy="223223"/>
+          </a:xfrm>
+          <a:prstGeom prst="straightConnector1">
+            <a:avLst/>
+          </a:prstGeom>
+          <a:ln w="12700" cmpd="sng">
+            <a:solidFill>
+              <a:schemeClr val="tx1">
+                <a:lumMod val="50000"/>
+                <a:lumOff val="50000"/>
+              </a:schemeClr>
+            </a:solidFill>
+            <a:tailEnd type="triangle"/>
+          </a:ln>
+          <a:effectLst/>
+        </p:spPr>
+        <p:style>
+          <a:lnRef idx="2">
+            <a:schemeClr val="accent1"/>
+          </a:lnRef>
+          <a:fillRef idx="0">
+            <a:schemeClr val="accent1"/>
+          </a:fillRef>
+          <a:effectRef idx="1">
+            <a:schemeClr val="accent1"/>
+          </a:effectRef>
+          <a:fontRef idx="minor">
+            <a:schemeClr val="tx1"/>
+          </a:fontRef>
+        </p:style>
+      </p:cxnSp>
+      <p:cxnSp>
+        <p:nvCxnSpPr>
+          <p:cNvPr id="217" name="Connecteur droit 216"/>
+          <p:cNvCxnSpPr/>
+          <p:nvPr/>
+        </p:nvCxnSpPr>
+        <p:spPr>
+          <a:xfrm>
+            <a:off x="12750092" y="4844682"/>
+            <a:ext cx="127000" cy="1"/>
+          </a:xfrm>
+          <a:prstGeom prst="line">
+            <a:avLst/>
+          </a:prstGeom>
+          <a:ln w="12700" cmpd="sng">
+            <a:solidFill>
+              <a:schemeClr val="tx1">
+                <a:lumMod val="50000"/>
+                <a:lumOff val="50000"/>
+              </a:schemeClr>
+            </a:solidFill>
+            <a:headEnd type="none"/>
+            <a:tailEnd type="none"/>
+          </a:ln>
+          <a:effectLst/>
+        </p:spPr>
+        <p:style>
+          <a:lnRef idx="2">
+            <a:schemeClr val="accent1"/>
+          </a:lnRef>
+          <a:fillRef idx="0">
+            <a:schemeClr val="accent1"/>
+          </a:fillRef>
+          <a:effectRef idx="1">
+            <a:schemeClr val="accent1"/>
+          </a:effectRef>
+          <a:fontRef idx="minor">
+            <a:schemeClr val="tx1"/>
+          </a:fontRef>
+        </p:style>
+      </p:cxnSp>
+      <p:sp>
+        <p:nvSpPr>
+          <p:cNvPr id="243" name="Rectangle 242"/>
+          <p:cNvSpPr/>
+          <p:nvPr/>
+        </p:nvSpPr>
+        <p:spPr>
+          <a:xfrm>
+            <a:off x="12875583" y="4722622"/>
+            <a:ext cx="229053" cy="213178"/>
+          </a:xfrm>
+          <a:prstGeom prst="rect">
+            <a:avLst/>
+          </a:prstGeom>
+          <a:noFill/>
+          <a:ln>
+            <a:noFill/>
+          </a:ln>
+          <a:effectLst/>
+        </p:spPr>
+        <p:style>
+          <a:lnRef idx="1">
+            <a:schemeClr val="accent1"/>
+          </a:lnRef>
+          <a:fillRef idx="3">
+            <a:schemeClr val="accent1"/>
+          </a:fillRef>
+          <a:effectRef idx="2">
+            <a:schemeClr val="accent1"/>
+          </a:effectRef>
+          <a:fontRef idx="minor">
+            <a:schemeClr val="lt1"/>
+          </a:fontRef>
+        </p:style>
+        <p:txBody>
+          <a:bodyPr lIns="36000" tIns="0" rIns="36000" bIns="0" rtlCol="0" anchor="ctr"/>
+          <a:lstStyle/>
+          <a:p>
+            <a:pPr algn="ctr"/>
+            <a:r>
+              <a:rPr lang="fr-FR" sz="600" dirty="0" smtClean="0">
+                <a:solidFill>
+                  <a:srgbClr val="FF0000"/>
+                </a:solidFill>
+                <a:latin typeface="Arial"/>
+                <a:cs typeface="Arial"/>
+              </a:rPr>
+              <a:t>NO</a:t>
+            </a:r>
+            <a:endParaRPr lang="fr-FR" sz="600" dirty="0">
+              <a:solidFill>
+                <a:srgbClr val="FF0000"/>
+              </a:solidFill>
+              <a:latin typeface="Arial"/>
+              <a:cs typeface="Arial"/>
+            </a:endParaRPr>
+          </a:p>
+        </p:txBody>
+      </p:sp>
+      <p:sp>
+        <p:nvSpPr>
+          <p:cNvPr id="245" name="Rectangle 244"/>
+          <p:cNvSpPr/>
+          <p:nvPr/>
+        </p:nvSpPr>
+        <p:spPr>
+          <a:xfrm>
+            <a:off x="13935811" y="4329765"/>
+            <a:ext cx="694910" cy="291014"/>
+          </a:xfrm>
+          <a:prstGeom prst="rect">
+            <a:avLst/>
+          </a:prstGeom>
+          <a:solidFill>
+            <a:schemeClr val="accent6">
+              <a:lumMod val="75000"/>
+            </a:schemeClr>
+          </a:solidFill>
+          <a:ln>
+            <a:noFill/>
+          </a:ln>
+          <a:effectLst/>
+        </p:spPr>
+        <p:style>
+          <a:lnRef idx="1">
+            <a:schemeClr val="accent1"/>
+          </a:lnRef>
+          <a:fillRef idx="3">
+            <a:schemeClr val="accent1"/>
+          </a:fillRef>
+          <a:effectRef idx="2">
+            <a:schemeClr val="accent1"/>
+          </a:effectRef>
+          <a:fontRef idx="minor">
+            <a:schemeClr val="lt1"/>
+          </a:fontRef>
+        </p:style>
+        <p:txBody>
+          <a:bodyPr lIns="36000" tIns="0" rIns="36000" bIns="0" rtlCol="0" anchor="ctr"/>
+          <a:lstStyle/>
+          <a:p>
+            <a:pPr algn="ctr"/>
+            <a:r>
+              <a:rPr lang="fr-FR" sz="600" dirty="0" err="1" smtClean="0">
+                <a:solidFill>
+                  <a:schemeClr val="bg1"/>
+                </a:solidFill>
+                <a:latin typeface="Arial"/>
+                <a:cs typeface="Arial"/>
+              </a:rPr>
+              <a:t>Clear</a:t>
+            </a:r>
+            <a:r>
+              <a:rPr lang="fr-FR" sz="600" dirty="0" smtClean="0">
+                <a:solidFill>
+                  <a:schemeClr val="bg1"/>
+                </a:solidFill>
+                <a:latin typeface="Arial"/>
+                <a:cs typeface="Arial"/>
+              </a:rPr>
+              <a:t> </a:t>
+            </a:r>
+            <a:r>
+              <a:rPr lang="fr-FR" sz="600" dirty="0" err="1" smtClean="0">
+                <a:solidFill>
+                  <a:schemeClr val="bg1"/>
+                </a:solidFill>
+                <a:latin typeface="Arial"/>
+                <a:cs typeface="Arial"/>
+              </a:rPr>
+              <a:t>keep.str</a:t>
+            </a:r>
+            <a:r>
+              <a:rPr lang="fr-FR" sz="600" dirty="0" smtClean="0">
+                <a:solidFill>
+                  <a:schemeClr val="bg1"/>
+                </a:solidFill>
+                <a:latin typeface="Arial"/>
+                <a:cs typeface="Arial"/>
+              </a:rPr>
+              <a:t>[n]</a:t>
+            </a:r>
+            <a:endParaRPr lang="fr-FR" sz="600" dirty="0">
+              <a:solidFill>
+                <a:schemeClr val="bg1"/>
+              </a:solidFill>
+              <a:latin typeface="Arial"/>
+              <a:cs typeface="Arial"/>
+            </a:endParaRPr>
+          </a:p>
+        </p:txBody>
+      </p:sp>
+      <p:cxnSp>
+        <p:nvCxnSpPr>
+          <p:cNvPr id="246" name="Connecteur droit avec flèche 245"/>
+          <p:cNvCxnSpPr>
+            <a:endCxn id="245" idx="1"/>
+          </p:cNvCxnSpPr>
+          <p:nvPr/>
+        </p:nvCxnSpPr>
+        <p:spPr>
+          <a:xfrm flipV="1">
+            <a:off x="13494117" y="4475272"/>
+            <a:ext cx="441694" cy="3386"/>
+          </a:xfrm>
+          <a:prstGeom prst="straightConnector1">
+            <a:avLst/>
+          </a:prstGeom>
+          <a:ln w="12700" cmpd="sng">
+            <a:solidFill>
+              <a:schemeClr val="tx1">
+                <a:lumMod val="50000"/>
+                <a:lumOff val="50000"/>
+              </a:schemeClr>
+            </a:solidFill>
+            <a:tailEnd type="triangle"/>
+          </a:ln>
+          <a:effectLst/>
+        </p:spPr>
+        <p:style>
+          <a:lnRef idx="2">
+            <a:schemeClr val="accent1"/>
+          </a:lnRef>
+          <a:fillRef idx="0">
+            <a:schemeClr val="accent1"/>
+          </a:fillRef>
+          <a:effectRef idx="1">
+            <a:schemeClr val="accent1"/>
+          </a:effectRef>
+          <a:fontRef idx="minor">
+            <a:schemeClr val="tx1"/>
+          </a:fontRef>
+        </p:style>
+      </p:cxnSp>
+      <p:sp>
+        <p:nvSpPr>
+          <p:cNvPr id="249" name="Rectangle 248"/>
+          <p:cNvSpPr/>
+          <p:nvPr/>
+        </p:nvSpPr>
+        <p:spPr>
+          <a:xfrm>
+            <a:off x="13542236" y="4478686"/>
+            <a:ext cx="229053" cy="213178"/>
+          </a:xfrm>
+          <a:prstGeom prst="rect">
+            <a:avLst/>
+          </a:prstGeom>
+          <a:noFill/>
+          <a:ln>
+            <a:noFill/>
+          </a:ln>
+          <a:effectLst/>
+        </p:spPr>
+        <p:style>
+          <a:lnRef idx="1">
+            <a:schemeClr val="accent1"/>
+          </a:lnRef>
+          <a:fillRef idx="3">
+            <a:schemeClr val="accent1"/>
+          </a:fillRef>
+          <a:effectRef idx="2">
+            <a:schemeClr val="accent1"/>
+          </a:effectRef>
+          <a:fontRef idx="minor">
+            <a:schemeClr val="lt1"/>
+          </a:fontRef>
+        </p:style>
+        <p:txBody>
+          <a:bodyPr lIns="36000" tIns="0" rIns="36000" bIns="0" rtlCol="0" anchor="ctr"/>
+          <a:lstStyle/>
+          <a:p>
+            <a:pPr algn="ctr"/>
+            <a:r>
+              <a:rPr lang="fr-FR" sz="600" dirty="0" smtClean="0">
+                <a:solidFill>
+                  <a:srgbClr val="008000"/>
+                </a:solidFill>
+                <a:latin typeface="Arial"/>
+                <a:cs typeface="Arial"/>
+              </a:rPr>
+              <a:t>YES</a:t>
+            </a:r>
+            <a:endParaRPr lang="fr-FR" sz="600" dirty="0">
+              <a:solidFill>
+                <a:srgbClr val="008000"/>
+              </a:solidFill>
+              <a:latin typeface="Arial"/>
+              <a:cs typeface="Arial"/>
+            </a:endParaRPr>
+          </a:p>
+        </p:txBody>
+      </p:sp>
+      <p:cxnSp>
+        <p:nvCxnSpPr>
+          <p:cNvPr id="252" name="Connecteur droit 251"/>
+          <p:cNvCxnSpPr/>
+          <p:nvPr/>
+        </p:nvCxnSpPr>
+        <p:spPr>
+          <a:xfrm flipV="1">
+            <a:off x="13650167" y="4424200"/>
+            <a:ext cx="0" cy="108916"/>
+          </a:xfrm>
+          <a:prstGeom prst="line">
+            <a:avLst/>
+          </a:prstGeom>
+          <a:ln w="12700" cmpd="sng">
+            <a:solidFill>
+              <a:schemeClr val="tx1">
+                <a:lumMod val="50000"/>
+                <a:lumOff val="50000"/>
+              </a:schemeClr>
+            </a:solidFill>
+            <a:headEnd type="none"/>
+            <a:tailEnd type="none"/>
+          </a:ln>
+          <a:effectLst/>
+        </p:spPr>
+        <p:style>
+          <a:lnRef idx="2">
+            <a:schemeClr val="accent1"/>
+          </a:lnRef>
+          <a:fillRef idx="0">
+            <a:schemeClr val="accent1"/>
+          </a:fillRef>
+          <a:effectRef idx="1">
+            <a:schemeClr val="accent1"/>
+          </a:effectRef>
+          <a:fontRef idx="minor">
+            <a:schemeClr val="tx1"/>
+          </a:fontRef>
+        </p:style>
+      </p:cxnSp>
+      <p:cxnSp>
+        <p:nvCxnSpPr>
+          <p:cNvPr id="253" name="Connecteur en angle 252"/>
+          <p:cNvCxnSpPr>
+            <a:stCxn id="245" idx="2"/>
+            <a:endCxn id="305" idx="3"/>
+          </p:cNvCxnSpPr>
+          <p:nvPr/>
+        </p:nvCxnSpPr>
+        <p:spPr>
+          <a:xfrm rot="5400000">
+            <a:off x="12653165" y="5177476"/>
+            <a:ext cx="2186798" cy="1073405"/>
+          </a:xfrm>
+          <a:prstGeom prst="bentConnector2">
+            <a:avLst/>
+          </a:prstGeom>
+          <a:ln w="12700" cmpd="sng">
+            <a:solidFill>
+              <a:schemeClr val="tx1">
+                <a:lumMod val="50000"/>
+                <a:lumOff val="50000"/>
+              </a:schemeClr>
+            </a:solidFill>
+            <a:tailEnd type="triangle"/>
+          </a:ln>
+          <a:effectLst/>
+        </p:spPr>
+        <p:style>
+          <a:lnRef idx="2">
+            <a:schemeClr val="accent1"/>
+          </a:lnRef>
+          <a:fillRef idx="0">
+            <a:schemeClr val="accent1"/>
+          </a:fillRef>
+          <a:effectRef idx="1">
+            <a:schemeClr val="accent1"/>
+          </a:effectRef>
+          <a:fontRef idx="minor">
+            <a:schemeClr val="tx1"/>
+          </a:fontRef>
+        </p:style>
+      </p:cxnSp>
     </p:spTree>
     <p:extLst>
       <p:ext uri="{BB962C8B-B14F-4D97-AF65-F5344CB8AC3E}">

</xml_diff>